<commit_message>
Fix typo on slide 3.  Add slide 15 about teachable machine.  Add sample model.
</commit_message>
<xml_diff>
--- a/AICreators-JamestownEvent.pptx
+++ b/AICreators-JamestownEvent.pptx
@@ -5,10 +5,10 @@
     <p:sldMasterId id="2147483705" r:id="rId4"/>
   </p:sldMasterIdLst>
   <p:notesMasterIdLst>
-    <p:notesMasterId r:id="rId20"/>
+    <p:notesMasterId r:id="rId21"/>
   </p:notesMasterIdLst>
   <p:handoutMasterIdLst>
-    <p:handoutMasterId r:id="rId21"/>
+    <p:handoutMasterId r:id="rId22"/>
   </p:handoutMasterIdLst>
   <p:sldIdLst>
     <p:sldId id="278" r:id="rId5"/>
@@ -25,7 +25,8 @@
     <p:sldId id="283" r:id="rId16"/>
     <p:sldId id="294" r:id="rId17"/>
     <p:sldId id="295" r:id="rId18"/>
-    <p:sldId id="292" r:id="rId19"/>
+    <p:sldId id="302" r:id="rId19"/>
+    <p:sldId id="292" r:id="rId20"/>
   </p:sldIdLst>
   <p:sldSz cx="12192000" cy="6858000"/>
   <p:notesSz cx="6858000" cy="9144000"/>
@@ -4589,7 +4590,7 @@
           <a:p>
             <a:fld id="{717BC71B-6527-4638-937B-C93EB849CB02}" type="datetimeFigureOut">
               <a:rPr lang="en-US" smtClean="0"/>
-              <a:t>2025-02-28</a:t>
+              <a:t>3/1/2025</a:t>
             </a:fld>
             <a:endParaRPr lang="en-US" dirty="0"/>
           </a:p>
@@ -4766,7 +4767,7 @@
           <a:p>
             <a:fld id="{425465A2-8C9C-419F-9FD8-234480873777}" type="datetimeFigureOut">
               <a:rPr lang="en-US" smtClean="0"/>
-              <a:t>2025-02-28</a:t>
+              <a:t>3/1/2025</a:t>
             </a:fld>
             <a:endParaRPr lang="en-US" dirty="0"/>
           </a:p>
@@ -6198,6 +6199,90 @@
     <p:extLst>
       <p:ext uri="{BB962C8B-B14F-4D97-AF65-F5344CB8AC3E}">
         <p14:creationId xmlns:p14="http://schemas.microsoft.com/office/powerpoint/2010/main" val="1381393920"/>
+      </p:ext>
+    </p:extLst>
+  </p:cSld>
+  <p:clrMapOvr>
+    <a:masterClrMapping/>
+  </p:clrMapOvr>
+</p:notes>
+</file>
+
+<file path=ppt/notesSlides/notesSlide13.xml><?xml version="1.0" encoding="utf-8"?>
+<p:notes xmlns:a="http://schemas.openxmlformats.org/drawingml/2006/main" xmlns:r="http://schemas.openxmlformats.org/officeDocument/2006/relationships" xmlns:p="http://schemas.openxmlformats.org/presentationml/2006/main">
+  <p:cSld>
+    <p:spTree>
+      <p:nvGrpSpPr>
+        <p:cNvPr id="1" name=""/>
+        <p:cNvGrpSpPr/>
+        <p:nvPr/>
+      </p:nvGrpSpPr>
+      <p:grpSpPr>
+        <a:xfrm>
+          <a:off x="0" y="0"/>
+          <a:ext cx="0" cy="0"/>
+          <a:chOff x="0" y="0"/>
+          <a:chExt cx="0" cy="0"/>
+        </a:xfrm>
+      </p:grpSpPr>
+      <p:sp>
+        <p:nvSpPr>
+          <p:cNvPr id="2" name="Slide Image Placeholder 1"/>
+          <p:cNvSpPr>
+            <a:spLocks noGrp="1" noRot="1" noChangeAspect="1"/>
+          </p:cNvSpPr>
+          <p:nvPr>
+            <p:ph type="sldImg"/>
+          </p:nvPr>
+        </p:nvSpPr>
+        <p:spPr/>
+      </p:sp>
+      <p:sp>
+        <p:nvSpPr>
+          <p:cNvPr id="3" name="Notes Placeholder 2"/>
+          <p:cNvSpPr>
+            <a:spLocks noGrp="1"/>
+          </p:cNvSpPr>
+          <p:nvPr>
+            <p:ph type="body" idx="1"/>
+          </p:nvPr>
+        </p:nvSpPr>
+        <p:spPr/>
+        <p:txBody>
+          <a:bodyPr/>
+          <a:lstStyle/>
+          <a:p>
+            <a:endParaRPr lang="en-US" dirty="0"/>
+          </a:p>
+        </p:txBody>
+      </p:sp>
+      <p:sp>
+        <p:nvSpPr>
+          <p:cNvPr id="4" name="Slide Number Placeholder 3"/>
+          <p:cNvSpPr>
+            <a:spLocks noGrp="1"/>
+          </p:cNvSpPr>
+          <p:nvPr>
+            <p:ph type="sldNum" sz="quarter" idx="5"/>
+          </p:nvPr>
+        </p:nvSpPr>
+        <p:spPr/>
+        <p:txBody>
+          <a:bodyPr/>
+          <a:lstStyle/>
+          <a:p>
+            <a:fld id="{E7AF00E9-A49D-4007-B3B9-A3783809E505}" type="slidenum">
+              <a:rPr lang="en-US" smtClean="0"/>
+              <a:t>15</a:t>
+            </a:fld>
+            <a:endParaRPr lang="en-US" dirty="0"/>
+          </a:p>
+        </p:txBody>
+      </p:sp>
+    </p:spTree>
+    <p:extLst>
+      <p:ext uri="{BB962C8B-B14F-4D97-AF65-F5344CB8AC3E}">
+        <p14:creationId xmlns:p14="http://schemas.microsoft.com/office/powerpoint/2010/main" val="2025447406"/>
       </p:ext>
     </p:extLst>
   </p:cSld>
@@ -25371,6 +25456,162 @@
           <p:cNvPr id="2" name="Title 1">
             <a:extLst>
               <a:ext uri="{FF2B5EF4-FFF2-40B4-BE49-F238E27FC236}">
+                <a16:creationId xmlns:a16="http://schemas.microsoft.com/office/drawing/2014/main" id="{0D52C83D-6243-D30D-6962-46AC59DF1787}"/>
+              </a:ext>
+            </a:extLst>
+          </p:cNvPr>
+          <p:cNvSpPr>
+            <a:spLocks noGrp="1"/>
+          </p:cNvSpPr>
+          <p:nvPr>
+            <p:ph type="ctrTitle"/>
+          </p:nvPr>
+        </p:nvSpPr>
+        <p:spPr/>
+        <p:txBody>
+          <a:bodyPr/>
+          <a:lstStyle/>
+          <a:p>
+            <a:r>
+              <a:rPr lang="en-US" dirty="0"/>
+              <a:t>Train and test your own model!</a:t>
+            </a:r>
+          </a:p>
+        </p:txBody>
+      </p:sp>
+      <p:sp>
+        <p:nvSpPr>
+          <p:cNvPr id="3" name="Subtitle 2">
+            <a:extLst>
+              <a:ext uri="{FF2B5EF4-FFF2-40B4-BE49-F238E27FC236}">
+                <a16:creationId xmlns:a16="http://schemas.microsoft.com/office/drawing/2014/main" id="{1A8C0E6D-FDB8-6548-67DA-E864E1DD0564}"/>
+              </a:ext>
+            </a:extLst>
+          </p:cNvPr>
+          <p:cNvSpPr>
+            <a:spLocks noGrp="1"/>
+          </p:cNvSpPr>
+          <p:nvPr>
+            <p:ph type="subTitle" idx="1"/>
+          </p:nvPr>
+        </p:nvSpPr>
+        <p:spPr>
+          <a:xfrm>
+            <a:off x="547271" y="3505200"/>
+            <a:ext cx="5832264" cy="2352356"/>
+          </a:xfrm>
+        </p:spPr>
+        <p:txBody>
+          <a:bodyPr/>
+          <a:lstStyle/>
+          <a:p>
+            <a:endParaRPr lang="en-US" dirty="0">
+              <a:hlinkClick r:id="rId3"/>
+            </a:endParaRPr>
+          </a:p>
+          <a:p>
+            <a:r>
+              <a:rPr lang="en-US" dirty="0">
+                <a:hlinkClick r:id="rId3"/>
+              </a:rPr>
+              <a:t>https://teachablemachine.withgoogle.com/</a:t>
+            </a:r>
+            <a:endParaRPr lang="en-US" dirty="0"/>
+          </a:p>
+          <a:p>
+            <a:endParaRPr lang="en-US" dirty="0"/>
+          </a:p>
+          <a:p>
+            <a:r>
+              <a:rPr lang="en-US" dirty="0"/>
+              <a:t>Data available at:</a:t>
+            </a:r>
+          </a:p>
+          <a:p>
+            <a:r>
+              <a:rPr lang="en-US" dirty="0">
+                <a:hlinkClick r:id="rId4"/>
+              </a:rPr>
+              <a:t>https://tinyurl.com/NDAISTEM</a:t>
+            </a:r>
+            <a:r>
+              <a:rPr lang="en-US" dirty="0"/>
+              <a:t> </a:t>
+            </a:r>
+          </a:p>
+        </p:txBody>
+      </p:sp>
+      <p:pic>
+        <p:nvPicPr>
+          <p:cNvPr id="6" name="Picture Placeholder 5" descr="A black cube with blue dots and lines&#10;&#10;AI-generated content may be incorrect.">
+            <a:extLst>
+              <a:ext uri="{FF2B5EF4-FFF2-40B4-BE49-F238E27FC236}">
+                <a16:creationId xmlns:a16="http://schemas.microsoft.com/office/drawing/2014/main" id="{1CAD1DE2-A2ED-CDFF-9119-7D5A2FB66522}"/>
+              </a:ext>
+            </a:extLst>
+          </p:cNvPr>
+          <p:cNvPicPr>
+            <a:picLocks noGrp="1" noChangeAspect="1"/>
+          </p:cNvPicPr>
+          <p:nvPr>
+            <p:ph type="pic" sz="quarter" idx="13"/>
+          </p:nvPr>
+        </p:nvPicPr>
+        <p:blipFill>
+          <a:blip r:embed="rId5">
+            <a:extLst>
+              <a:ext uri="{28A0092B-C50C-407E-A947-70E740481C1C}">
+                <a14:useLocalDpi xmlns:a14="http://schemas.microsoft.com/office/drawing/2010/main" val="0"/>
+              </a:ext>
+            </a:extLst>
+          </a:blip>
+          <a:srcRect l="16038" r="16038"/>
+          <a:stretch>
+            <a:fillRect/>
+          </a:stretch>
+        </p:blipFill>
+        <p:spPr>
+          <a:xfrm>
+            <a:off x="6096000" y="804060"/>
+            <a:ext cx="5132388" cy="5132388"/>
+          </a:xfrm>
+        </p:spPr>
+      </p:pic>
+    </p:spTree>
+    <p:extLst>
+      <p:ext uri="{BB962C8B-B14F-4D97-AF65-F5344CB8AC3E}">
+        <p14:creationId xmlns:p14="http://schemas.microsoft.com/office/powerpoint/2010/main" val="436421148"/>
+      </p:ext>
+    </p:extLst>
+  </p:cSld>
+  <p:clrMapOvr>
+    <a:masterClrMapping/>
+  </p:clrMapOvr>
+</p:sld>
+</file>
+
+<file path=ppt/slides/slide16.xml><?xml version="1.0" encoding="utf-8"?>
+<p:sld xmlns:a="http://schemas.openxmlformats.org/drawingml/2006/main" xmlns:r="http://schemas.openxmlformats.org/officeDocument/2006/relationships" xmlns:p="http://schemas.openxmlformats.org/presentationml/2006/main">
+  <p:cSld>
+    <p:spTree>
+      <p:nvGrpSpPr>
+        <p:cNvPr id="1" name=""/>
+        <p:cNvGrpSpPr/>
+        <p:nvPr/>
+      </p:nvGrpSpPr>
+      <p:grpSpPr>
+        <a:xfrm>
+          <a:off x="0" y="0"/>
+          <a:ext cx="0" cy="0"/>
+          <a:chOff x="0" y="0"/>
+          <a:chExt cx="0" cy="0"/>
+        </a:xfrm>
+      </p:grpSpPr>
+      <p:sp>
+        <p:nvSpPr>
+          <p:cNvPr id="2" name="Title 1">
+            <a:extLst>
+              <a:ext uri="{FF2B5EF4-FFF2-40B4-BE49-F238E27FC236}">
                 <a16:creationId xmlns:a16="http://schemas.microsoft.com/office/drawing/2014/main" id="{28BAC361-0D7A-DC05-86B5-6DD77D322F5B}"/>
               </a:ext>
             </a:extLst>
@@ -27568,7 +27809,7 @@
                 <a:ea typeface="+mj-ea"/>
                 <a:cs typeface="+mj-cs"/>
               </a:rPr>
-              <a:t>Can you describe all of the object in this image?</a:t>
+              <a:t>Can you describe all of the objects in this image?</a:t>
             </a:r>
           </a:p>
         </p:txBody>
@@ -37215,15 +37456,6 @@
 </file>
 
 <file path=customXml/item1.xml><?xml version="1.0" encoding="utf-8"?>
-<?mso-contentType ?>
-<FormTemplates xmlns="http://schemas.microsoft.com/sharepoint/v3/contenttype/forms">
-  <Display>DocumentLibraryForm</Display>
-  <Edit>DocumentLibraryForm</Edit>
-  <New>DocumentLibraryForm</New>
-</FormTemplates>
-</file>
-
-<file path=customXml/item2.xml><?xml version="1.0" encoding="utf-8"?>
 <ct:contentTypeSchema xmlns:ct="http://schemas.microsoft.com/office/2006/metadata/contentType" xmlns:ma="http://schemas.microsoft.com/office/2006/metadata/properties/metaAttributes" ct:_="" ma:_="" ma:contentTypeName="Document" ma:contentTypeID="0x01010079F111ED35F8CC479449609E8A0923A6" ma:contentTypeVersion="28" ma:contentTypeDescription="Create a new document." ma:contentTypeScope="" ma:versionID="60f5a4f2d2b0abadcf532d48ebf9cb71">
   <xsd:schema xmlns:xsd="http://www.w3.org/2001/XMLSchema" xmlns:xs="http://www.w3.org/2001/XMLSchema" xmlns:p="http://schemas.microsoft.com/office/2006/metadata/properties" xmlns:ns1="http://schemas.microsoft.com/sharepoint/v3" xmlns:ns2="71af3243-3dd4-4a8d-8c0d-dd76da1f02a5" xmlns:ns3="16c05727-aa75-4e4a-9b5f-8a80a1165891" xmlns:ns4="230e9df3-be65-4c73-a93b-d1236ebd677e" targetNamespace="http://schemas.microsoft.com/office/2006/metadata/properties" ma:root="true" ma:fieldsID="7dd78129e6a1811f84807ad11c651531" ns1:_="" ns2:_="" ns3:_="" ns4:_="">
     <xsd:import namespace="http://schemas.microsoft.com/sharepoint/v3"/>
@@ -37535,6 +37767,15 @@
 </ct:contentTypeSchema>
 </file>
 
+<file path=customXml/item2.xml><?xml version="1.0" encoding="utf-8"?>
+<?mso-contentType ?>
+<FormTemplates xmlns="http://schemas.microsoft.com/sharepoint/v3/contenttype/forms">
+  <Display>DocumentLibraryForm</Display>
+  <Edit>DocumentLibraryForm</Edit>
+  <New>DocumentLibraryForm</New>
+</FormTemplates>
+</file>
+
 <file path=customXml/item3.xml><?xml version="1.0" encoding="utf-8"?>
 <p:properties xmlns:p="http://schemas.microsoft.com/office/2006/metadata/properties" xmlns:xsi="http://www.w3.org/2001/XMLSchema-instance" xmlns:pc="http://schemas.microsoft.com/office/infopath/2007/PartnerControls">
   <documentManagement>
@@ -37556,14 +37797,6 @@
 </file>
 
 <file path=customXml/itemProps1.xml><?xml version="1.0" encoding="utf-8"?>
-<ds:datastoreItem xmlns:ds="http://schemas.openxmlformats.org/officeDocument/2006/customXml" ds:itemID="{2F49CD38-5B57-4682-9FCE-B9174068D0AE}">
-  <ds:schemaRefs>
-    <ds:schemaRef ds:uri="http://schemas.microsoft.com/sharepoint/v3/contenttype/forms"/>
-  </ds:schemaRefs>
-</ds:datastoreItem>
-</file>
-
-<file path=customXml/itemProps2.xml><?xml version="1.0" encoding="utf-8"?>
 <ds:datastoreItem xmlns:ds="http://schemas.openxmlformats.org/officeDocument/2006/customXml" ds:itemID="{797783A8-901D-4F73-81D7-AA6841BEB3D7}">
   <ds:schemaRefs>
     <ds:schemaRef ds:uri="http://schemas.microsoft.com/office/2006/metadata/contentType"/>
@@ -37580,6 +37813,14 @@
     <ds:schemaRef ds:uri="http://purl.org/dc/elements/1.1/"/>
     <ds:schemaRef ds:uri="http://purl.org/dc/terms/"/>
     <ds:schemaRef ds:uri="http://schemas.microsoft.com/internal/obd"/>
+  </ds:schemaRefs>
+</ds:datastoreItem>
+</file>
+
+<file path=customXml/itemProps2.xml><?xml version="1.0" encoding="utf-8"?>
+<ds:datastoreItem xmlns:ds="http://schemas.openxmlformats.org/officeDocument/2006/customXml" ds:itemID="{2F49CD38-5B57-4682-9FCE-B9174068D0AE}">
+  <ds:schemaRefs>
+    <ds:schemaRef ds:uri="http://schemas.microsoft.com/sharepoint/v3/contenttype/forms"/>
   </ds:schemaRefs>
 </ds:datastoreItem>
 </file>

</xml_diff>